<commit_message>
[Fix]add sns logo & fix image path
</commit_message>
<xml_diff>
--- a/generator/version1/case.pptx
+++ b/generator/version1/case.pptx
@@ -116,6 +116,7 @@
 <file path=ppt/revisionInfo.xml><?xml version="1.0" encoding="utf-8"?>
 <p1510:revInfo xmlns:a="http://schemas.openxmlformats.org/drawingml/2006/main" xmlns:r="http://schemas.openxmlformats.org/officeDocument/2006/relationships" xmlns:p1510="http://schemas.microsoft.com/office/powerpoint/2015/10/main">
   <p1510:revLst>
+    <p1510:client id="{3B7522B6-D5BC-4E9B-A845-72B14F52FC4F}" v="6" dt="2022-05-26T06:50:01.978"/>
     <p1510:client id="{A79A9E43-8E5B-45F6-B7C8-CED0391556C9}" v="23" dt="2022-05-25T08:46:21.833"/>
   </p1510:revLst>
 </p1510:revInfo>
@@ -123,6 +124,302 @@
 
 <file path=ppt/changesInfos/changesInfo1.xml><?xml version="1.0" encoding="utf-8"?>
 <pc:chgInfo xmlns:a="http://schemas.openxmlformats.org/drawingml/2006/main" xmlns:r="http://schemas.openxmlformats.org/officeDocument/2006/relationships" xmlns:ac="http://schemas.microsoft.com/office/drawing/2013/main/command" xmlns:pc="http://schemas.microsoft.com/office/powerpoint/2013/main/command">
+  <pc:docChgLst>
+    <pc:chgData name="LEE HYUNHONG" userId="94839493944bc538" providerId="LiveId" clId="{3B7522B6-D5BC-4E9B-A845-72B14F52FC4F}"/>
+    <pc:docChg chg="undo custSel modSld">
+      <pc:chgData name="LEE HYUNHONG" userId="94839493944bc538" providerId="LiveId" clId="{3B7522B6-D5BC-4E9B-A845-72B14F52FC4F}" dt="2022-05-26T06:54:37.795" v="107" actId="14100"/>
+      <pc:docMkLst>
+        <pc:docMk/>
+      </pc:docMkLst>
+      <pc:sldChg chg="addSp modSp mod">
+        <pc:chgData name="LEE HYUNHONG" userId="94839493944bc538" providerId="LiveId" clId="{3B7522B6-D5BC-4E9B-A845-72B14F52FC4F}" dt="2022-05-26T06:54:37.795" v="107" actId="14100"/>
+        <pc:sldMkLst>
+          <pc:docMk/>
+          <pc:sldMk cId="1583193587" sldId="257"/>
+        </pc:sldMkLst>
+        <pc:spChg chg="mod">
+          <ac:chgData name="LEE HYUNHONG" userId="94839493944bc538" providerId="LiveId" clId="{3B7522B6-D5BC-4E9B-A845-72B14F52FC4F}" dt="2022-05-26T05:49:14.065" v="0" actId="571"/>
+          <ac:spMkLst>
+            <pc:docMk/>
+            <pc:sldMk cId="1583193587" sldId="257"/>
+            <ac:spMk id="31" creationId="{B33747F1-DE46-5F64-75DB-F1FDE3ECBF50}"/>
+          </ac:spMkLst>
+        </pc:spChg>
+        <pc:spChg chg="mod">
+          <ac:chgData name="LEE HYUNHONG" userId="94839493944bc538" providerId="LiveId" clId="{3B7522B6-D5BC-4E9B-A845-72B14F52FC4F}" dt="2022-05-26T05:57:31.131" v="17" actId="20577"/>
+          <ac:spMkLst>
+            <pc:docMk/>
+            <pc:sldMk cId="1583193587" sldId="257"/>
+            <ac:spMk id="32" creationId="{F447FBD3-7B54-261A-6FB8-B14A1D942C86}"/>
+          </ac:spMkLst>
+        </pc:spChg>
+        <pc:spChg chg="mod">
+          <ac:chgData name="LEE HYUNHONG" userId="94839493944bc538" providerId="LiveId" clId="{3B7522B6-D5BC-4E9B-A845-72B14F52FC4F}" dt="2022-05-26T05:49:14.065" v="0" actId="571"/>
+          <ac:spMkLst>
+            <pc:docMk/>
+            <pc:sldMk cId="1583193587" sldId="257"/>
+            <ac:spMk id="33" creationId="{C2020056-ADE1-F1EE-A84A-1B43074361B9}"/>
+          </ac:spMkLst>
+        </pc:spChg>
+        <pc:spChg chg="mod">
+          <ac:chgData name="LEE HYUNHONG" userId="94839493944bc538" providerId="LiveId" clId="{3B7522B6-D5BC-4E9B-A845-72B14F52FC4F}" dt="2022-05-26T05:57:09.376" v="15" actId="14100"/>
+          <ac:spMkLst>
+            <pc:docMk/>
+            <pc:sldMk cId="1583193587" sldId="257"/>
+            <ac:spMk id="34" creationId="{201725FB-0431-3A6A-6E19-FAC9B36837DF}"/>
+          </ac:spMkLst>
+        </pc:spChg>
+        <pc:spChg chg="mod">
+          <ac:chgData name="LEE HYUNHONG" userId="94839493944bc538" providerId="LiveId" clId="{3B7522B6-D5BC-4E9B-A845-72B14F52FC4F}" dt="2022-05-26T05:58:09.167" v="20" actId="14100"/>
+          <ac:spMkLst>
+            <pc:docMk/>
+            <pc:sldMk cId="1583193587" sldId="257"/>
+            <ac:spMk id="35" creationId="{805C988B-0035-D929-40DF-1F0D9617BC9B}"/>
+          </ac:spMkLst>
+        </pc:spChg>
+        <pc:spChg chg="mod">
+          <ac:chgData name="LEE HYUNHONG" userId="94839493944bc538" providerId="LiveId" clId="{3B7522B6-D5BC-4E9B-A845-72B14F52FC4F}" dt="2022-05-26T05:58:06.367" v="19" actId="14100"/>
+          <ac:spMkLst>
+            <pc:docMk/>
+            <pc:sldMk cId="1583193587" sldId="257"/>
+            <ac:spMk id="36" creationId="{268D093A-E2CA-51D7-D514-8152565B5EC0}"/>
+          </ac:spMkLst>
+        </pc:spChg>
+        <pc:spChg chg="mod">
+          <ac:chgData name="LEE HYUNHONG" userId="94839493944bc538" providerId="LiveId" clId="{3B7522B6-D5BC-4E9B-A845-72B14F52FC4F}" dt="2022-05-26T06:47:12.098" v="22" actId="571"/>
+          <ac:spMkLst>
+            <pc:docMk/>
+            <pc:sldMk cId="1583193587" sldId="257"/>
+            <ac:spMk id="38" creationId="{98973E2D-748A-1848-5B1B-796D0BF77038}"/>
+          </ac:spMkLst>
+        </pc:spChg>
+        <pc:spChg chg="mod">
+          <ac:chgData name="LEE HYUNHONG" userId="94839493944bc538" providerId="LiveId" clId="{3B7522B6-D5BC-4E9B-A845-72B14F52FC4F}" dt="2022-05-26T06:47:12.098" v="22" actId="571"/>
+          <ac:spMkLst>
+            <pc:docMk/>
+            <pc:sldMk cId="1583193587" sldId="257"/>
+            <ac:spMk id="39" creationId="{7A634A43-0CD9-D9F4-55B2-062F4B80275E}"/>
+          </ac:spMkLst>
+        </pc:spChg>
+        <pc:spChg chg="mod">
+          <ac:chgData name="LEE HYUNHONG" userId="94839493944bc538" providerId="LiveId" clId="{3B7522B6-D5BC-4E9B-A845-72B14F52FC4F}" dt="2022-05-26T06:47:12.098" v="22" actId="571"/>
+          <ac:spMkLst>
+            <pc:docMk/>
+            <pc:sldMk cId="1583193587" sldId="257"/>
+            <ac:spMk id="40" creationId="{492BE3BD-0550-62AF-DE46-034D4E475697}"/>
+          </ac:spMkLst>
+        </pc:spChg>
+        <pc:spChg chg="mod">
+          <ac:chgData name="LEE HYUNHONG" userId="94839493944bc538" providerId="LiveId" clId="{3B7522B6-D5BC-4E9B-A845-72B14F52FC4F}" dt="2022-05-26T06:47:12.098" v="22" actId="571"/>
+          <ac:spMkLst>
+            <pc:docMk/>
+            <pc:sldMk cId="1583193587" sldId="257"/>
+            <ac:spMk id="41" creationId="{E8BC40EC-ACCC-2AEC-56D6-8780898AC95E}"/>
+          </ac:spMkLst>
+        </pc:spChg>
+        <pc:spChg chg="mod">
+          <ac:chgData name="LEE HYUNHONG" userId="94839493944bc538" providerId="LiveId" clId="{3B7522B6-D5BC-4E9B-A845-72B14F52FC4F}" dt="2022-05-26T06:47:12.098" v="22" actId="571"/>
+          <ac:spMkLst>
+            <pc:docMk/>
+            <pc:sldMk cId="1583193587" sldId="257"/>
+            <ac:spMk id="42" creationId="{A4FDAA6E-35A3-6B96-0D6D-A158BF4EC0FE}"/>
+          </ac:spMkLst>
+        </pc:spChg>
+        <pc:spChg chg="mod">
+          <ac:chgData name="LEE HYUNHONG" userId="94839493944bc538" providerId="LiveId" clId="{3B7522B6-D5BC-4E9B-A845-72B14F52FC4F}" dt="2022-05-26T06:47:12.098" v="22" actId="571"/>
+          <ac:spMkLst>
+            <pc:docMk/>
+            <pc:sldMk cId="1583193587" sldId="257"/>
+            <ac:spMk id="43" creationId="{DB518948-D8B9-67CA-8A3B-13BAE3F983E3}"/>
+          </ac:spMkLst>
+        </pc:spChg>
+        <pc:spChg chg="mod">
+          <ac:chgData name="LEE HYUNHONG" userId="94839493944bc538" providerId="LiveId" clId="{3B7522B6-D5BC-4E9B-A845-72B14F52FC4F}" dt="2022-05-26T06:47:17.081" v="23" actId="571"/>
+          <ac:spMkLst>
+            <pc:docMk/>
+            <pc:sldMk cId="1583193587" sldId="257"/>
+            <ac:spMk id="45" creationId="{F8E615FE-4AEC-D018-870B-61307886562E}"/>
+          </ac:spMkLst>
+        </pc:spChg>
+        <pc:spChg chg="mod">
+          <ac:chgData name="LEE HYUNHONG" userId="94839493944bc538" providerId="LiveId" clId="{3B7522B6-D5BC-4E9B-A845-72B14F52FC4F}" dt="2022-05-26T06:49:10.927" v="73" actId="20577"/>
+          <ac:spMkLst>
+            <pc:docMk/>
+            <pc:sldMk cId="1583193587" sldId="257"/>
+            <ac:spMk id="46" creationId="{66716FD6-F1A9-58CD-955B-6B109EE45CB4}"/>
+          </ac:spMkLst>
+        </pc:spChg>
+        <pc:spChg chg="mod">
+          <ac:chgData name="LEE HYUNHONG" userId="94839493944bc538" providerId="LiveId" clId="{3B7522B6-D5BC-4E9B-A845-72B14F52FC4F}" dt="2022-05-26T06:47:17.081" v="23" actId="571"/>
+          <ac:spMkLst>
+            <pc:docMk/>
+            <pc:sldMk cId="1583193587" sldId="257"/>
+            <ac:spMk id="47" creationId="{C017AB33-3CCD-6010-DCCE-3BA045C62E0A}"/>
+          </ac:spMkLst>
+        </pc:spChg>
+        <pc:spChg chg="mod">
+          <ac:chgData name="LEE HYUNHONG" userId="94839493944bc538" providerId="LiveId" clId="{3B7522B6-D5BC-4E9B-A845-72B14F52FC4F}" dt="2022-05-26T06:48:39.369" v="71" actId="14100"/>
+          <ac:spMkLst>
+            <pc:docMk/>
+            <pc:sldMk cId="1583193587" sldId="257"/>
+            <ac:spMk id="48" creationId="{C690FB34-2F3A-B857-B162-ADC2426DD8D7}"/>
+          </ac:spMkLst>
+        </pc:spChg>
+        <pc:spChg chg="mod">
+          <ac:chgData name="LEE HYUNHONG" userId="94839493944bc538" providerId="LiveId" clId="{3B7522B6-D5BC-4E9B-A845-72B14F52FC4F}" dt="2022-05-26T06:48:35.758" v="70" actId="1076"/>
+          <ac:spMkLst>
+            <pc:docMk/>
+            <pc:sldMk cId="1583193587" sldId="257"/>
+            <ac:spMk id="49" creationId="{D2D89A6D-EDF6-0FE3-F849-E9C2866AC3AD}"/>
+          </ac:spMkLst>
+        </pc:spChg>
+        <pc:spChg chg="mod">
+          <ac:chgData name="LEE HYUNHONG" userId="94839493944bc538" providerId="LiveId" clId="{3B7522B6-D5BC-4E9B-A845-72B14F52FC4F}" dt="2022-05-26T06:47:40.764" v="29" actId="1076"/>
+          <ac:spMkLst>
+            <pc:docMk/>
+            <pc:sldMk cId="1583193587" sldId="257"/>
+            <ac:spMk id="50" creationId="{FA9EC130-FFA3-0AC8-F778-0DC790165576}"/>
+          </ac:spMkLst>
+        </pc:spChg>
+        <pc:spChg chg="mod">
+          <ac:chgData name="LEE HYUNHONG" userId="94839493944bc538" providerId="LiveId" clId="{3B7522B6-D5BC-4E9B-A845-72B14F52FC4F}" dt="2022-05-26T06:49:43.563" v="74" actId="571"/>
+          <ac:spMkLst>
+            <pc:docMk/>
+            <pc:sldMk cId="1583193587" sldId="257"/>
+            <ac:spMk id="52" creationId="{39F09459-0969-3946-1DD7-6F454B10B5D1}"/>
+          </ac:spMkLst>
+        </pc:spChg>
+        <pc:spChg chg="mod">
+          <ac:chgData name="LEE HYUNHONG" userId="94839493944bc538" providerId="LiveId" clId="{3B7522B6-D5BC-4E9B-A845-72B14F52FC4F}" dt="2022-05-26T06:52:47.579" v="84" actId="20577"/>
+          <ac:spMkLst>
+            <pc:docMk/>
+            <pc:sldMk cId="1583193587" sldId="257"/>
+            <ac:spMk id="53" creationId="{67124010-C3DB-C0FC-D84A-8493B059CA03}"/>
+          </ac:spMkLst>
+        </pc:spChg>
+        <pc:spChg chg="mod">
+          <ac:chgData name="LEE HYUNHONG" userId="94839493944bc538" providerId="LiveId" clId="{3B7522B6-D5BC-4E9B-A845-72B14F52FC4F}" dt="2022-05-26T06:51:58.331" v="79" actId="14100"/>
+          <ac:spMkLst>
+            <pc:docMk/>
+            <pc:sldMk cId="1583193587" sldId="257"/>
+            <ac:spMk id="54" creationId="{CB4EE820-5C5F-16D7-7D05-13F117A01D67}"/>
+          </ac:spMkLst>
+        </pc:spChg>
+        <pc:spChg chg="mod">
+          <ac:chgData name="LEE HYUNHONG" userId="94839493944bc538" providerId="LiveId" clId="{3B7522B6-D5BC-4E9B-A845-72B14F52FC4F}" dt="2022-05-26T06:52:08.974" v="80" actId="14100"/>
+          <ac:spMkLst>
+            <pc:docMk/>
+            <pc:sldMk cId="1583193587" sldId="257"/>
+            <ac:spMk id="55" creationId="{2376C1FC-9152-CE4B-B7B4-B1C96DB04BCA}"/>
+          </ac:spMkLst>
+        </pc:spChg>
+        <pc:spChg chg="mod">
+          <ac:chgData name="LEE HYUNHONG" userId="94839493944bc538" providerId="LiveId" clId="{3B7522B6-D5BC-4E9B-A845-72B14F52FC4F}" dt="2022-05-26T06:53:57.877" v="98" actId="20577"/>
+          <ac:spMkLst>
+            <pc:docMk/>
+            <pc:sldMk cId="1583193587" sldId="257"/>
+            <ac:spMk id="56" creationId="{AFBD3E6A-2707-C283-5BCF-B23596F885D6}"/>
+          </ac:spMkLst>
+        </pc:spChg>
+        <pc:spChg chg="mod">
+          <ac:chgData name="LEE HYUNHONG" userId="94839493944bc538" providerId="LiveId" clId="{3B7522B6-D5BC-4E9B-A845-72B14F52FC4F}" dt="2022-05-26T06:53:03.880" v="87" actId="14100"/>
+          <ac:spMkLst>
+            <pc:docMk/>
+            <pc:sldMk cId="1583193587" sldId="257"/>
+            <ac:spMk id="57" creationId="{CE0A0E31-5AAE-EEF8-7AF1-142A751DC696}"/>
+          </ac:spMkLst>
+        </pc:spChg>
+        <pc:spChg chg="mod">
+          <ac:chgData name="LEE HYUNHONG" userId="94839493944bc538" providerId="LiveId" clId="{3B7522B6-D5BC-4E9B-A845-72B14F52FC4F}" dt="2022-05-26T06:50:01.976" v="76" actId="571"/>
+          <ac:spMkLst>
+            <pc:docMk/>
+            <pc:sldMk cId="1583193587" sldId="257"/>
+            <ac:spMk id="59" creationId="{65C96C72-5AE8-658F-6C18-8A03FCF858E0}"/>
+          </ac:spMkLst>
+        </pc:spChg>
+        <pc:spChg chg="mod">
+          <ac:chgData name="LEE HYUNHONG" userId="94839493944bc538" providerId="LiveId" clId="{3B7522B6-D5BC-4E9B-A845-72B14F52FC4F}" dt="2022-05-26T06:52:50.936" v="86" actId="20577"/>
+          <ac:spMkLst>
+            <pc:docMk/>
+            <pc:sldMk cId="1583193587" sldId="257"/>
+            <ac:spMk id="60" creationId="{B430BC7E-C7CF-F710-525C-0BC5D37A0648}"/>
+          </ac:spMkLst>
+        </pc:spChg>
+        <pc:spChg chg="mod">
+          <ac:chgData name="LEE HYUNHONG" userId="94839493944bc538" providerId="LiveId" clId="{3B7522B6-D5BC-4E9B-A845-72B14F52FC4F}" dt="2022-05-26T06:52:18.409" v="81" actId="14100"/>
+          <ac:spMkLst>
+            <pc:docMk/>
+            <pc:sldMk cId="1583193587" sldId="257"/>
+            <ac:spMk id="62" creationId="{3C4A44D1-9F27-655F-3737-1291A3B782AD}"/>
+          </ac:spMkLst>
+        </pc:spChg>
+        <pc:spChg chg="mod">
+          <ac:chgData name="LEE HYUNHONG" userId="94839493944bc538" providerId="LiveId" clId="{3B7522B6-D5BC-4E9B-A845-72B14F52FC4F}" dt="2022-05-26T06:52:24.534" v="82" actId="14100"/>
+          <ac:spMkLst>
+            <pc:docMk/>
+            <pc:sldMk cId="1583193587" sldId="257"/>
+            <ac:spMk id="63" creationId="{9491D668-5FCF-52E5-BB84-08D7EE200640}"/>
+          </ac:spMkLst>
+        </pc:spChg>
+        <pc:spChg chg="mod">
+          <ac:chgData name="LEE HYUNHONG" userId="94839493944bc538" providerId="LiveId" clId="{3B7522B6-D5BC-4E9B-A845-72B14F52FC4F}" dt="2022-05-26T06:54:00.945" v="106" actId="20577"/>
+          <ac:spMkLst>
+            <pc:docMk/>
+            <pc:sldMk cId="1583193587" sldId="257"/>
+            <ac:spMk id="64" creationId="{A719A408-98E9-9B63-F3B9-5B5046A6AA75}"/>
+          </ac:spMkLst>
+        </pc:spChg>
+        <pc:spChg chg="mod">
+          <ac:chgData name="LEE HYUNHONG" userId="94839493944bc538" providerId="LiveId" clId="{3B7522B6-D5BC-4E9B-A845-72B14F52FC4F}" dt="2022-05-26T06:54:37.795" v="107" actId="14100"/>
+          <ac:spMkLst>
+            <pc:docMk/>
+            <pc:sldMk cId="1583193587" sldId="257"/>
+            <ac:spMk id="65" creationId="{6023A731-C9B1-E724-82C8-619F1D7A8160}"/>
+          </ac:spMkLst>
+        </pc:spChg>
+        <pc:grpChg chg="add mod">
+          <ac:chgData name="LEE HYUNHONG" userId="94839493944bc538" providerId="LiveId" clId="{3B7522B6-D5BC-4E9B-A845-72B14F52FC4F}" dt="2022-05-26T05:49:14.065" v="0" actId="571"/>
+          <ac:grpSpMkLst>
+            <pc:docMk/>
+            <pc:sldMk cId="1583193587" sldId="257"/>
+            <ac:grpSpMk id="30" creationId="{332262D5-21F6-5ED7-0631-C352E6EDFC62}"/>
+          </ac:grpSpMkLst>
+        </pc:grpChg>
+        <pc:grpChg chg="add mod">
+          <ac:chgData name="LEE HYUNHONG" userId="94839493944bc538" providerId="LiveId" clId="{3B7522B6-D5BC-4E9B-A845-72B14F52FC4F}" dt="2022-05-26T06:47:12.098" v="22" actId="571"/>
+          <ac:grpSpMkLst>
+            <pc:docMk/>
+            <pc:sldMk cId="1583193587" sldId="257"/>
+            <ac:grpSpMk id="37" creationId="{9F5A6690-1EE9-40A5-6EC8-E3D284010F72}"/>
+          </ac:grpSpMkLst>
+        </pc:grpChg>
+        <pc:grpChg chg="add mod">
+          <ac:chgData name="LEE HYUNHONG" userId="94839493944bc538" providerId="LiveId" clId="{3B7522B6-D5BC-4E9B-A845-72B14F52FC4F}" dt="2022-05-26T06:47:27.309" v="26" actId="1076"/>
+          <ac:grpSpMkLst>
+            <pc:docMk/>
+            <pc:sldMk cId="1583193587" sldId="257"/>
+            <ac:grpSpMk id="44" creationId="{7D0A3D92-390D-60F1-C720-27398C17109D}"/>
+          </ac:grpSpMkLst>
+        </pc:grpChg>
+        <pc:grpChg chg="add mod">
+          <ac:chgData name="LEE HYUNHONG" userId="94839493944bc538" providerId="LiveId" clId="{3B7522B6-D5BC-4E9B-A845-72B14F52FC4F}" dt="2022-05-26T06:50:08.815" v="77" actId="14100"/>
+          <ac:grpSpMkLst>
+            <pc:docMk/>
+            <pc:sldMk cId="1583193587" sldId="257"/>
+            <ac:grpSpMk id="51" creationId="{081D5939-B382-8130-6E6B-5E44BA83B275}"/>
+          </ac:grpSpMkLst>
+        </pc:grpChg>
+        <pc:grpChg chg="add mod">
+          <ac:chgData name="LEE HYUNHONG" userId="94839493944bc538" providerId="LiveId" clId="{3B7522B6-D5BC-4E9B-A845-72B14F52FC4F}" dt="2022-05-26T06:50:01.976" v="76" actId="571"/>
+          <ac:grpSpMkLst>
+            <pc:docMk/>
+            <pc:sldMk cId="1583193587" sldId="257"/>
+            <ac:grpSpMk id="58" creationId="{D1AC4A3E-863F-8425-DED7-F1F463315BE1}"/>
+          </ac:grpSpMkLst>
+        </pc:grpChg>
+      </pc:sldChg>
+    </pc:docChg>
+  </pc:docChgLst>
   <pc:docChgLst>
     <pc:chgData name="LEE HYUNHONG" userId="94839493944bc538" providerId="LiveId" clId="{A79A9E43-8E5B-45F6-B7C8-CED0391556C9}"/>
     <pc:docChg chg="undo custSel addSld modSld">
@@ -1464,7 +1761,7 @@
           <a:p>
             <a:fld id="{88BA31F8-F92B-4862-AB8D-4D55C6166B72}" type="datetimeFigureOut">
               <a:rPr lang="ko-KR" altLang="en-US" smtClean="0"/>
-              <a:t>2022-05-25</a:t>
+              <a:t>2022-05-26</a:t>
             </a:fld>
             <a:endParaRPr lang="ko-KR" altLang="en-US"/>
           </a:p>
@@ -1634,7 +1931,7 @@
           <a:p>
             <a:fld id="{88BA31F8-F92B-4862-AB8D-4D55C6166B72}" type="datetimeFigureOut">
               <a:rPr lang="ko-KR" altLang="en-US" smtClean="0"/>
-              <a:t>2022-05-25</a:t>
+              <a:t>2022-05-26</a:t>
             </a:fld>
             <a:endParaRPr lang="ko-KR" altLang="en-US"/>
           </a:p>
@@ -1814,7 +2111,7 @@
           <a:p>
             <a:fld id="{88BA31F8-F92B-4862-AB8D-4D55C6166B72}" type="datetimeFigureOut">
               <a:rPr lang="ko-KR" altLang="en-US" smtClean="0"/>
-              <a:t>2022-05-25</a:t>
+              <a:t>2022-05-26</a:t>
             </a:fld>
             <a:endParaRPr lang="ko-KR" altLang="en-US"/>
           </a:p>
@@ -1984,7 +2281,7 @@
           <a:p>
             <a:fld id="{88BA31F8-F92B-4862-AB8D-4D55C6166B72}" type="datetimeFigureOut">
               <a:rPr lang="ko-KR" altLang="en-US" smtClean="0"/>
-              <a:t>2022-05-25</a:t>
+              <a:t>2022-05-26</a:t>
             </a:fld>
             <a:endParaRPr lang="ko-KR" altLang="en-US"/>
           </a:p>
@@ -2228,7 +2525,7 @@
           <a:p>
             <a:fld id="{88BA31F8-F92B-4862-AB8D-4D55C6166B72}" type="datetimeFigureOut">
               <a:rPr lang="ko-KR" altLang="en-US" smtClean="0"/>
-              <a:t>2022-05-25</a:t>
+              <a:t>2022-05-26</a:t>
             </a:fld>
             <a:endParaRPr lang="ko-KR" altLang="en-US"/>
           </a:p>
@@ -2460,7 +2757,7 @@
           <a:p>
             <a:fld id="{88BA31F8-F92B-4862-AB8D-4D55C6166B72}" type="datetimeFigureOut">
               <a:rPr lang="ko-KR" altLang="en-US" smtClean="0"/>
-              <a:t>2022-05-25</a:t>
+              <a:t>2022-05-26</a:t>
             </a:fld>
             <a:endParaRPr lang="ko-KR" altLang="en-US"/>
           </a:p>
@@ -2827,7 +3124,7 @@
           <a:p>
             <a:fld id="{88BA31F8-F92B-4862-AB8D-4D55C6166B72}" type="datetimeFigureOut">
               <a:rPr lang="ko-KR" altLang="en-US" smtClean="0"/>
-              <a:t>2022-05-25</a:t>
+              <a:t>2022-05-26</a:t>
             </a:fld>
             <a:endParaRPr lang="ko-KR" altLang="en-US"/>
           </a:p>
@@ -2945,7 +3242,7 @@
           <a:p>
             <a:fld id="{88BA31F8-F92B-4862-AB8D-4D55C6166B72}" type="datetimeFigureOut">
               <a:rPr lang="ko-KR" altLang="en-US" smtClean="0"/>
-              <a:t>2022-05-25</a:t>
+              <a:t>2022-05-26</a:t>
             </a:fld>
             <a:endParaRPr lang="ko-KR" altLang="en-US"/>
           </a:p>
@@ -3040,7 +3337,7 @@
           <a:p>
             <a:fld id="{88BA31F8-F92B-4862-AB8D-4D55C6166B72}" type="datetimeFigureOut">
               <a:rPr lang="ko-KR" altLang="en-US" smtClean="0"/>
-              <a:t>2022-05-25</a:t>
+              <a:t>2022-05-26</a:t>
             </a:fld>
             <a:endParaRPr lang="ko-KR" altLang="en-US"/>
           </a:p>
@@ -3317,7 +3614,7 @@
           <a:p>
             <a:fld id="{88BA31F8-F92B-4862-AB8D-4D55C6166B72}" type="datetimeFigureOut">
               <a:rPr lang="ko-KR" altLang="en-US" smtClean="0"/>
-              <a:t>2022-05-25</a:t>
+              <a:t>2022-05-26</a:t>
             </a:fld>
             <a:endParaRPr lang="ko-KR" altLang="en-US"/>
           </a:p>
@@ -3574,7 +3871,7 @@
           <a:p>
             <a:fld id="{88BA31F8-F92B-4862-AB8D-4D55C6166B72}" type="datetimeFigureOut">
               <a:rPr lang="ko-KR" altLang="en-US" smtClean="0"/>
-              <a:t>2022-05-25</a:t>
+              <a:t>2022-05-26</a:t>
             </a:fld>
             <a:endParaRPr lang="ko-KR" altLang="en-US"/>
           </a:p>
@@ -3787,7 +4084,7 @@
           <a:p>
             <a:fld id="{88BA31F8-F92B-4862-AB8D-4D55C6166B72}" type="datetimeFigureOut">
               <a:rPr lang="ko-KR" altLang="en-US" smtClean="0"/>
-              <a:t>2022-05-25</a:t>
+              <a:t>2022-05-26</a:t>
             </a:fld>
             <a:endParaRPr lang="ko-KR" altLang="en-US"/>
           </a:p>
@@ -8202,6 +8499,1378 @@
           </p:txBody>
         </p:sp>
       </p:grpSp>
+      <p:grpSp>
+        <p:nvGrpSpPr>
+          <p:cNvPr id="30" name="그룹 29">
+            <a:extLst>
+              <a:ext uri="{FF2B5EF4-FFF2-40B4-BE49-F238E27FC236}">
+                <a16:creationId xmlns:a16="http://schemas.microsoft.com/office/drawing/2014/main" id="{332262D5-21F6-5ED7-0631-C352E6EDFC62}"/>
+              </a:ext>
+            </a:extLst>
+          </p:cNvPr>
+          <p:cNvGrpSpPr/>
+          <p:nvPr/>
+        </p:nvGrpSpPr>
+        <p:grpSpPr>
+          <a:xfrm>
+            <a:off x="125562" y="5029246"/>
+            <a:ext cx="3240000" cy="2098212"/>
+            <a:chOff x="125563" y="357211"/>
+            <a:chExt cx="3240000" cy="2098212"/>
+          </a:xfrm>
+        </p:grpSpPr>
+        <p:sp>
+          <p:nvSpPr>
+            <p:cNvPr id="31" name="직사각형 30">
+              <a:extLst>
+                <a:ext uri="{FF2B5EF4-FFF2-40B4-BE49-F238E27FC236}">
+                  <a16:creationId xmlns:a16="http://schemas.microsoft.com/office/drawing/2014/main" id="{B33747F1-DE46-5F64-75DB-F1FDE3ECBF50}"/>
+                </a:ext>
+              </a:extLst>
+            </p:cNvPr>
+            <p:cNvSpPr/>
+            <p:nvPr/>
+          </p:nvSpPr>
+          <p:spPr>
+            <a:xfrm>
+              <a:off x="125563" y="357211"/>
+              <a:ext cx="3240000" cy="1800000"/>
+            </a:xfrm>
+            <a:prstGeom prst="rect">
+              <a:avLst/>
+            </a:prstGeom>
+            <a:noFill/>
+            <a:ln>
+              <a:solidFill>
+                <a:schemeClr val="tx1"/>
+              </a:solidFill>
+            </a:ln>
+          </p:spPr>
+          <p:style>
+            <a:lnRef idx="2">
+              <a:schemeClr val="accent1">
+                <a:shade val="50000"/>
+              </a:schemeClr>
+            </a:lnRef>
+            <a:fillRef idx="1">
+              <a:schemeClr val="accent1"/>
+            </a:fillRef>
+            <a:effectRef idx="0">
+              <a:schemeClr val="accent1"/>
+            </a:effectRef>
+            <a:fontRef idx="minor">
+              <a:schemeClr val="lt1"/>
+            </a:fontRef>
+          </p:style>
+          <p:txBody>
+            <a:bodyPr rtlCol="0" anchor="ctr"/>
+            <a:lstStyle/>
+            <a:p>
+              <a:pPr algn="ctr"/>
+              <a:endParaRPr lang="ko-KR" altLang="en-US">
+                <a:solidFill>
+                  <a:schemeClr val="tx1"/>
+                </a:solidFill>
+              </a:endParaRPr>
+            </a:p>
+          </p:txBody>
+        </p:sp>
+        <p:sp>
+          <p:nvSpPr>
+            <p:cNvPr id="32" name="TextBox 31">
+              <a:extLst>
+                <a:ext uri="{FF2B5EF4-FFF2-40B4-BE49-F238E27FC236}">
+                  <a16:creationId xmlns:a16="http://schemas.microsoft.com/office/drawing/2014/main" id="{F447FBD3-7B54-261A-6FB8-B14A1D942C86}"/>
+                </a:ext>
+              </a:extLst>
+            </p:cNvPr>
+            <p:cNvSpPr txBox="1"/>
+            <p:nvPr/>
+          </p:nvSpPr>
+          <p:spPr>
+            <a:xfrm>
+              <a:off x="1388894" y="2086091"/>
+              <a:ext cx="830356" cy="369332"/>
+            </a:xfrm>
+            <a:prstGeom prst="rect">
+              <a:avLst/>
+            </a:prstGeom>
+            <a:noFill/>
+          </p:spPr>
+          <p:txBody>
+            <a:bodyPr wrap="none" rtlCol="0">
+              <a:spAutoFit/>
+            </a:bodyPr>
+            <a:lstStyle/>
+            <a:p>
+              <a:r>
+                <a:rPr lang="en-US" altLang="ko-KR" dirty="0">
+                  <a:solidFill>
+                    <a:schemeClr val="tx1">
+                      <a:lumMod val="65000"/>
+                      <a:lumOff val="35000"/>
+                    </a:schemeClr>
+                  </a:solidFill>
+                </a:rPr>
+                <a:t>case13</a:t>
+              </a:r>
+              <a:endParaRPr lang="ko-KR" altLang="en-US" dirty="0">
+                <a:solidFill>
+                  <a:schemeClr val="tx1">
+                    <a:lumMod val="65000"/>
+                    <a:lumOff val="35000"/>
+                  </a:schemeClr>
+                </a:solidFill>
+              </a:endParaRPr>
+            </a:p>
+          </p:txBody>
+        </p:sp>
+        <p:sp>
+          <p:nvSpPr>
+            <p:cNvPr id="33" name="직사각형 32">
+              <a:extLst>
+                <a:ext uri="{FF2B5EF4-FFF2-40B4-BE49-F238E27FC236}">
+                  <a16:creationId xmlns:a16="http://schemas.microsoft.com/office/drawing/2014/main" id="{C2020056-ADE1-F1EE-A84A-1B43074361B9}"/>
+                </a:ext>
+              </a:extLst>
+            </p:cNvPr>
+            <p:cNvSpPr/>
+            <p:nvPr/>
+          </p:nvSpPr>
+          <p:spPr>
+            <a:xfrm>
+              <a:off x="259080" y="457157"/>
+              <a:ext cx="2961640" cy="386080"/>
+            </a:xfrm>
+            <a:prstGeom prst="rect">
+              <a:avLst/>
+            </a:prstGeom>
+            <a:solidFill>
+              <a:schemeClr val="accent1">
+                <a:lumMod val="20000"/>
+                <a:lumOff val="80000"/>
+              </a:schemeClr>
+            </a:solidFill>
+          </p:spPr>
+          <p:style>
+            <a:lnRef idx="2">
+              <a:schemeClr val="dk1"/>
+            </a:lnRef>
+            <a:fillRef idx="1">
+              <a:schemeClr val="lt1"/>
+            </a:fillRef>
+            <a:effectRef idx="0">
+              <a:schemeClr val="dk1"/>
+            </a:effectRef>
+            <a:fontRef idx="minor">
+              <a:schemeClr val="dk1"/>
+            </a:fontRef>
+          </p:style>
+          <p:txBody>
+            <a:bodyPr rtlCol="0" anchor="ctr"/>
+            <a:lstStyle/>
+            <a:p>
+              <a:pPr algn="ctr"/>
+              <a:r>
+                <a:rPr lang="en-US" altLang="ko-KR" dirty="0" err="1"/>
+                <a:t>logobox</a:t>
+              </a:r>
+              <a:endParaRPr lang="ko-KR" altLang="en-US" dirty="0"/>
+            </a:p>
+          </p:txBody>
+        </p:sp>
+        <p:sp>
+          <p:nvSpPr>
+            <p:cNvPr id="34" name="직사각형 33">
+              <a:extLst>
+                <a:ext uri="{FF2B5EF4-FFF2-40B4-BE49-F238E27FC236}">
+                  <a16:creationId xmlns:a16="http://schemas.microsoft.com/office/drawing/2014/main" id="{201725FB-0431-3A6A-6E19-FAC9B36837DF}"/>
+                </a:ext>
+              </a:extLst>
+            </p:cNvPr>
+            <p:cNvSpPr/>
+            <p:nvPr/>
+          </p:nvSpPr>
+          <p:spPr>
+            <a:xfrm>
+              <a:off x="259079" y="910606"/>
+              <a:ext cx="1385401" cy="1150124"/>
+            </a:xfrm>
+            <a:prstGeom prst="rect">
+              <a:avLst/>
+            </a:prstGeom>
+            <a:solidFill>
+              <a:schemeClr val="accent2">
+                <a:lumMod val="20000"/>
+                <a:lumOff val="80000"/>
+              </a:schemeClr>
+            </a:solidFill>
+          </p:spPr>
+          <p:style>
+            <a:lnRef idx="2">
+              <a:schemeClr val="dk1"/>
+            </a:lnRef>
+            <a:fillRef idx="1">
+              <a:schemeClr val="lt1"/>
+            </a:fillRef>
+            <a:effectRef idx="0">
+              <a:schemeClr val="dk1"/>
+            </a:effectRef>
+            <a:fontRef idx="minor">
+              <a:schemeClr val="dk1"/>
+            </a:fontRef>
+          </p:style>
+          <p:txBody>
+            <a:bodyPr rtlCol="0" anchor="ctr"/>
+            <a:lstStyle/>
+            <a:p>
+              <a:pPr algn="ctr"/>
+              <a:r>
+                <a:rPr lang="en-US" altLang="ko-KR" dirty="0" err="1"/>
+                <a:t>namebox</a:t>
+              </a:r>
+              <a:endParaRPr lang="ko-KR" altLang="en-US" dirty="0"/>
+            </a:p>
+          </p:txBody>
+        </p:sp>
+        <p:sp>
+          <p:nvSpPr>
+            <p:cNvPr id="35" name="직사각형 34">
+              <a:extLst>
+                <a:ext uri="{FF2B5EF4-FFF2-40B4-BE49-F238E27FC236}">
+                  <a16:creationId xmlns:a16="http://schemas.microsoft.com/office/drawing/2014/main" id="{805C988B-0035-D929-40DF-1F0D9617BC9B}"/>
+                </a:ext>
+              </a:extLst>
+            </p:cNvPr>
+            <p:cNvSpPr/>
+            <p:nvPr/>
+          </p:nvSpPr>
+          <p:spPr>
+            <a:xfrm>
+              <a:off x="2390363" y="1356355"/>
+              <a:ext cx="830356" cy="704376"/>
+            </a:xfrm>
+            <a:prstGeom prst="rect">
+              <a:avLst/>
+            </a:prstGeom>
+            <a:solidFill>
+              <a:schemeClr val="accent4">
+                <a:lumMod val="20000"/>
+                <a:lumOff val="80000"/>
+              </a:schemeClr>
+            </a:solidFill>
+          </p:spPr>
+          <p:style>
+            <a:lnRef idx="2">
+              <a:schemeClr val="dk1"/>
+            </a:lnRef>
+            <a:fillRef idx="1">
+              <a:schemeClr val="lt1"/>
+            </a:fillRef>
+            <a:effectRef idx="0">
+              <a:schemeClr val="dk1"/>
+            </a:effectRef>
+            <a:fontRef idx="minor">
+              <a:schemeClr val="dk1"/>
+            </a:fontRef>
+          </p:style>
+          <p:txBody>
+            <a:bodyPr rtlCol="0" anchor="ctr"/>
+            <a:lstStyle/>
+            <a:p>
+              <a:pPr algn="ctr"/>
+              <a:r>
+                <a:rPr lang="en-US" altLang="ko-KR" dirty="0"/>
+                <a:t>optionbox1</a:t>
+              </a:r>
+              <a:endParaRPr lang="ko-KR" altLang="en-US" dirty="0"/>
+            </a:p>
+          </p:txBody>
+        </p:sp>
+        <p:sp>
+          <p:nvSpPr>
+            <p:cNvPr id="36" name="직사각형 35">
+              <a:extLst>
+                <a:ext uri="{FF2B5EF4-FFF2-40B4-BE49-F238E27FC236}">
+                  <a16:creationId xmlns:a16="http://schemas.microsoft.com/office/drawing/2014/main" id="{268D093A-E2CA-51D7-D514-8152565B5EC0}"/>
+                </a:ext>
+              </a:extLst>
+            </p:cNvPr>
+            <p:cNvSpPr/>
+            <p:nvPr/>
+          </p:nvSpPr>
+          <p:spPr>
+            <a:xfrm>
+              <a:off x="1789324" y="910607"/>
+              <a:ext cx="830356" cy="670240"/>
+            </a:xfrm>
+            <a:prstGeom prst="rect">
+              <a:avLst/>
+            </a:prstGeom>
+            <a:solidFill>
+              <a:schemeClr val="accent6">
+                <a:lumMod val="20000"/>
+                <a:lumOff val="80000"/>
+              </a:schemeClr>
+            </a:solidFill>
+          </p:spPr>
+          <p:style>
+            <a:lnRef idx="2">
+              <a:schemeClr val="dk1"/>
+            </a:lnRef>
+            <a:fillRef idx="1">
+              <a:schemeClr val="lt1"/>
+            </a:fillRef>
+            <a:effectRef idx="0">
+              <a:schemeClr val="dk1"/>
+            </a:effectRef>
+            <a:fontRef idx="minor">
+              <a:schemeClr val="dk1"/>
+            </a:fontRef>
+          </p:style>
+          <p:txBody>
+            <a:bodyPr rtlCol="0" anchor="ctr"/>
+            <a:lstStyle/>
+            <a:p>
+              <a:pPr algn="ctr"/>
+              <a:r>
+                <a:rPr lang="en-US" altLang="ko-KR" dirty="0"/>
+                <a:t>optionbox2</a:t>
+              </a:r>
+              <a:endParaRPr lang="ko-KR" altLang="en-US" dirty="0"/>
+            </a:p>
+          </p:txBody>
+        </p:sp>
+      </p:grpSp>
+      <p:grpSp>
+        <p:nvGrpSpPr>
+          <p:cNvPr id="44" name="그룹 43">
+            <a:extLst>
+              <a:ext uri="{FF2B5EF4-FFF2-40B4-BE49-F238E27FC236}">
+                <a16:creationId xmlns:a16="http://schemas.microsoft.com/office/drawing/2014/main" id="{7D0A3D92-390D-60F1-C720-27398C17109D}"/>
+              </a:ext>
+            </a:extLst>
+          </p:cNvPr>
+          <p:cNvGrpSpPr/>
+          <p:nvPr/>
+        </p:nvGrpSpPr>
+        <p:grpSpPr>
+          <a:xfrm>
+            <a:off x="3504586" y="5029246"/>
+            <a:ext cx="3240000" cy="2098212"/>
+            <a:chOff x="125563" y="357211"/>
+            <a:chExt cx="3240000" cy="2098212"/>
+          </a:xfrm>
+        </p:grpSpPr>
+        <p:sp>
+          <p:nvSpPr>
+            <p:cNvPr id="45" name="직사각형 44">
+              <a:extLst>
+                <a:ext uri="{FF2B5EF4-FFF2-40B4-BE49-F238E27FC236}">
+                  <a16:creationId xmlns:a16="http://schemas.microsoft.com/office/drawing/2014/main" id="{F8E615FE-4AEC-D018-870B-61307886562E}"/>
+                </a:ext>
+              </a:extLst>
+            </p:cNvPr>
+            <p:cNvSpPr/>
+            <p:nvPr/>
+          </p:nvSpPr>
+          <p:spPr>
+            <a:xfrm>
+              <a:off x="125563" y="357211"/>
+              <a:ext cx="3240000" cy="1800000"/>
+            </a:xfrm>
+            <a:prstGeom prst="rect">
+              <a:avLst/>
+            </a:prstGeom>
+            <a:noFill/>
+            <a:ln>
+              <a:solidFill>
+                <a:schemeClr val="tx1"/>
+              </a:solidFill>
+            </a:ln>
+          </p:spPr>
+          <p:style>
+            <a:lnRef idx="2">
+              <a:schemeClr val="accent1">
+                <a:shade val="50000"/>
+              </a:schemeClr>
+            </a:lnRef>
+            <a:fillRef idx="1">
+              <a:schemeClr val="accent1"/>
+            </a:fillRef>
+            <a:effectRef idx="0">
+              <a:schemeClr val="accent1"/>
+            </a:effectRef>
+            <a:fontRef idx="minor">
+              <a:schemeClr val="lt1"/>
+            </a:fontRef>
+          </p:style>
+          <p:txBody>
+            <a:bodyPr rtlCol="0" anchor="ctr"/>
+            <a:lstStyle/>
+            <a:p>
+              <a:pPr algn="ctr"/>
+              <a:endParaRPr lang="ko-KR" altLang="en-US">
+                <a:solidFill>
+                  <a:schemeClr val="tx1"/>
+                </a:solidFill>
+              </a:endParaRPr>
+            </a:p>
+          </p:txBody>
+        </p:sp>
+        <p:sp>
+          <p:nvSpPr>
+            <p:cNvPr id="46" name="TextBox 45">
+              <a:extLst>
+                <a:ext uri="{FF2B5EF4-FFF2-40B4-BE49-F238E27FC236}">
+                  <a16:creationId xmlns:a16="http://schemas.microsoft.com/office/drawing/2014/main" id="{66716FD6-F1A9-58CD-955B-6B109EE45CB4}"/>
+                </a:ext>
+              </a:extLst>
+            </p:cNvPr>
+            <p:cNvSpPr txBox="1"/>
+            <p:nvPr/>
+          </p:nvSpPr>
+          <p:spPr>
+            <a:xfrm>
+              <a:off x="1388894" y="2086091"/>
+              <a:ext cx="830356" cy="369332"/>
+            </a:xfrm>
+            <a:prstGeom prst="rect">
+              <a:avLst/>
+            </a:prstGeom>
+            <a:noFill/>
+          </p:spPr>
+          <p:txBody>
+            <a:bodyPr wrap="none" rtlCol="0">
+              <a:spAutoFit/>
+            </a:bodyPr>
+            <a:lstStyle/>
+            <a:p>
+              <a:r>
+                <a:rPr lang="en-US" altLang="ko-KR" dirty="0">
+                  <a:solidFill>
+                    <a:schemeClr val="tx1">
+                      <a:lumMod val="65000"/>
+                      <a:lumOff val="35000"/>
+                    </a:schemeClr>
+                  </a:solidFill>
+                </a:rPr>
+                <a:t>case14</a:t>
+              </a:r>
+              <a:endParaRPr lang="ko-KR" altLang="en-US" dirty="0">
+                <a:solidFill>
+                  <a:schemeClr val="tx1">
+                    <a:lumMod val="65000"/>
+                    <a:lumOff val="35000"/>
+                  </a:schemeClr>
+                </a:solidFill>
+              </a:endParaRPr>
+            </a:p>
+          </p:txBody>
+        </p:sp>
+        <p:sp>
+          <p:nvSpPr>
+            <p:cNvPr id="47" name="직사각형 46">
+              <a:extLst>
+                <a:ext uri="{FF2B5EF4-FFF2-40B4-BE49-F238E27FC236}">
+                  <a16:creationId xmlns:a16="http://schemas.microsoft.com/office/drawing/2014/main" id="{C017AB33-3CCD-6010-DCCE-3BA045C62E0A}"/>
+                </a:ext>
+              </a:extLst>
+            </p:cNvPr>
+            <p:cNvSpPr/>
+            <p:nvPr/>
+          </p:nvSpPr>
+          <p:spPr>
+            <a:xfrm>
+              <a:off x="259080" y="457157"/>
+              <a:ext cx="2961640" cy="386080"/>
+            </a:xfrm>
+            <a:prstGeom prst="rect">
+              <a:avLst/>
+            </a:prstGeom>
+            <a:solidFill>
+              <a:schemeClr val="accent1">
+                <a:lumMod val="20000"/>
+                <a:lumOff val="80000"/>
+              </a:schemeClr>
+            </a:solidFill>
+          </p:spPr>
+          <p:style>
+            <a:lnRef idx="2">
+              <a:schemeClr val="dk1"/>
+            </a:lnRef>
+            <a:fillRef idx="1">
+              <a:schemeClr val="lt1"/>
+            </a:fillRef>
+            <a:effectRef idx="0">
+              <a:schemeClr val="dk1"/>
+            </a:effectRef>
+            <a:fontRef idx="minor">
+              <a:schemeClr val="dk1"/>
+            </a:fontRef>
+          </p:style>
+          <p:txBody>
+            <a:bodyPr rtlCol="0" anchor="ctr"/>
+            <a:lstStyle/>
+            <a:p>
+              <a:pPr algn="ctr"/>
+              <a:r>
+                <a:rPr lang="en-US" altLang="ko-KR" dirty="0" err="1"/>
+                <a:t>logobox</a:t>
+              </a:r>
+              <a:endParaRPr lang="ko-KR" altLang="en-US" dirty="0"/>
+            </a:p>
+          </p:txBody>
+        </p:sp>
+        <p:sp>
+          <p:nvSpPr>
+            <p:cNvPr id="48" name="직사각형 47">
+              <a:extLst>
+                <a:ext uri="{FF2B5EF4-FFF2-40B4-BE49-F238E27FC236}">
+                  <a16:creationId xmlns:a16="http://schemas.microsoft.com/office/drawing/2014/main" id="{C690FB34-2F3A-B857-B162-ADC2426DD8D7}"/>
+                </a:ext>
+              </a:extLst>
+            </p:cNvPr>
+            <p:cNvSpPr/>
+            <p:nvPr/>
+          </p:nvSpPr>
+          <p:spPr>
+            <a:xfrm>
+              <a:off x="259080" y="910607"/>
+              <a:ext cx="1341639" cy="386080"/>
+            </a:xfrm>
+            <a:prstGeom prst="rect">
+              <a:avLst/>
+            </a:prstGeom>
+            <a:solidFill>
+              <a:schemeClr val="accent2">
+                <a:lumMod val="20000"/>
+                <a:lumOff val="80000"/>
+              </a:schemeClr>
+            </a:solidFill>
+          </p:spPr>
+          <p:style>
+            <a:lnRef idx="2">
+              <a:schemeClr val="dk1"/>
+            </a:lnRef>
+            <a:fillRef idx="1">
+              <a:schemeClr val="lt1"/>
+            </a:fillRef>
+            <a:effectRef idx="0">
+              <a:schemeClr val="dk1"/>
+            </a:effectRef>
+            <a:fontRef idx="minor">
+              <a:schemeClr val="dk1"/>
+            </a:fontRef>
+          </p:style>
+          <p:txBody>
+            <a:bodyPr rtlCol="0" anchor="ctr"/>
+            <a:lstStyle/>
+            <a:p>
+              <a:pPr algn="ctr"/>
+              <a:r>
+                <a:rPr lang="en-US" altLang="ko-KR" dirty="0" err="1"/>
+                <a:t>namebox</a:t>
+              </a:r>
+              <a:endParaRPr lang="ko-KR" altLang="en-US" dirty="0"/>
+            </a:p>
+          </p:txBody>
+        </p:sp>
+        <p:sp>
+          <p:nvSpPr>
+            <p:cNvPr id="49" name="직사각형 48">
+              <a:extLst>
+                <a:ext uri="{FF2B5EF4-FFF2-40B4-BE49-F238E27FC236}">
+                  <a16:creationId xmlns:a16="http://schemas.microsoft.com/office/drawing/2014/main" id="{D2D89A6D-EDF6-0FE3-F849-E9C2866AC3AD}"/>
+                </a:ext>
+              </a:extLst>
+            </p:cNvPr>
+            <p:cNvSpPr/>
+            <p:nvPr/>
+          </p:nvSpPr>
+          <p:spPr>
+            <a:xfrm>
+              <a:off x="269583" y="1360080"/>
+              <a:ext cx="2961640" cy="326909"/>
+            </a:xfrm>
+            <a:prstGeom prst="rect">
+              <a:avLst/>
+            </a:prstGeom>
+            <a:solidFill>
+              <a:schemeClr val="accent4">
+                <a:lumMod val="20000"/>
+                <a:lumOff val="80000"/>
+              </a:schemeClr>
+            </a:solidFill>
+          </p:spPr>
+          <p:style>
+            <a:lnRef idx="2">
+              <a:schemeClr val="dk1"/>
+            </a:lnRef>
+            <a:fillRef idx="1">
+              <a:schemeClr val="lt1"/>
+            </a:fillRef>
+            <a:effectRef idx="0">
+              <a:schemeClr val="dk1"/>
+            </a:effectRef>
+            <a:fontRef idx="minor">
+              <a:schemeClr val="dk1"/>
+            </a:fontRef>
+          </p:style>
+          <p:txBody>
+            <a:bodyPr rtlCol="0" anchor="ctr"/>
+            <a:lstStyle/>
+            <a:p>
+              <a:pPr algn="ctr"/>
+              <a:r>
+                <a:rPr lang="en-US" altLang="ko-KR" dirty="0"/>
+                <a:t>optionbox1(double)</a:t>
+              </a:r>
+              <a:endParaRPr lang="ko-KR" altLang="en-US" dirty="0"/>
+            </a:p>
+          </p:txBody>
+        </p:sp>
+        <p:sp>
+          <p:nvSpPr>
+            <p:cNvPr id="50" name="직사각형 49">
+              <a:extLst>
+                <a:ext uri="{FF2B5EF4-FFF2-40B4-BE49-F238E27FC236}">
+                  <a16:creationId xmlns:a16="http://schemas.microsoft.com/office/drawing/2014/main" id="{FA9EC130-FFA3-0AC8-F778-0DC790165576}"/>
+                </a:ext>
+              </a:extLst>
+            </p:cNvPr>
+            <p:cNvSpPr/>
+            <p:nvPr/>
+          </p:nvSpPr>
+          <p:spPr>
+            <a:xfrm>
+              <a:off x="269583" y="1780761"/>
+              <a:ext cx="2950316" cy="278244"/>
+            </a:xfrm>
+            <a:prstGeom prst="rect">
+              <a:avLst/>
+            </a:prstGeom>
+            <a:solidFill>
+              <a:schemeClr val="accent6">
+                <a:lumMod val="20000"/>
+                <a:lumOff val="80000"/>
+              </a:schemeClr>
+            </a:solidFill>
+          </p:spPr>
+          <p:style>
+            <a:lnRef idx="2">
+              <a:schemeClr val="dk1"/>
+            </a:lnRef>
+            <a:fillRef idx="1">
+              <a:schemeClr val="lt1"/>
+            </a:fillRef>
+            <a:effectRef idx="0">
+              <a:schemeClr val="dk1"/>
+            </a:effectRef>
+            <a:fontRef idx="minor">
+              <a:schemeClr val="dk1"/>
+            </a:fontRef>
+          </p:style>
+          <p:txBody>
+            <a:bodyPr rtlCol="0" anchor="ctr"/>
+            <a:lstStyle/>
+            <a:p>
+              <a:pPr algn="ctr"/>
+              <a:r>
+                <a:rPr lang="en-US" altLang="ko-KR" dirty="0"/>
+                <a:t>optionbox2</a:t>
+              </a:r>
+              <a:endParaRPr lang="ko-KR" altLang="en-US" dirty="0"/>
+            </a:p>
+          </p:txBody>
+        </p:sp>
+      </p:grpSp>
+      <p:grpSp>
+        <p:nvGrpSpPr>
+          <p:cNvPr id="51" name="그룹 50">
+            <a:extLst>
+              <a:ext uri="{FF2B5EF4-FFF2-40B4-BE49-F238E27FC236}">
+                <a16:creationId xmlns:a16="http://schemas.microsoft.com/office/drawing/2014/main" id="{081D5939-B382-8130-6E6B-5E44BA83B275}"/>
+              </a:ext>
+            </a:extLst>
+          </p:cNvPr>
+          <p:cNvGrpSpPr/>
+          <p:nvPr/>
+        </p:nvGrpSpPr>
+        <p:grpSpPr>
+          <a:xfrm>
+            <a:off x="169323" y="7398922"/>
+            <a:ext cx="3196239" cy="2098212"/>
+            <a:chOff x="125563" y="357211"/>
+            <a:chExt cx="3240000" cy="2098212"/>
+          </a:xfrm>
+        </p:grpSpPr>
+        <p:sp>
+          <p:nvSpPr>
+            <p:cNvPr id="52" name="직사각형 51">
+              <a:extLst>
+                <a:ext uri="{FF2B5EF4-FFF2-40B4-BE49-F238E27FC236}">
+                  <a16:creationId xmlns:a16="http://schemas.microsoft.com/office/drawing/2014/main" id="{39F09459-0969-3946-1DD7-6F454B10B5D1}"/>
+                </a:ext>
+              </a:extLst>
+            </p:cNvPr>
+            <p:cNvSpPr/>
+            <p:nvPr/>
+          </p:nvSpPr>
+          <p:spPr>
+            <a:xfrm>
+              <a:off x="125563" y="357211"/>
+              <a:ext cx="3240000" cy="1800000"/>
+            </a:xfrm>
+            <a:prstGeom prst="rect">
+              <a:avLst/>
+            </a:prstGeom>
+            <a:noFill/>
+            <a:ln>
+              <a:solidFill>
+                <a:schemeClr val="tx1"/>
+              </a:solidFill>
+            </a:ln>
+          </p:spPr>
+          <p:style>
+            <a:lnRef idx="2">
+              <a:schemeClr val="accent1">
+                <a:shade val="50000"/>
+              </a:schemeClr>
+            </a:lnRef>
+            <a:fillRef idx="1">
+              <a:schemeClr val="accent1"/>
+            </a:fillRef>
+            <a:effectRef idx="0">
+              <a:schemeClr val="accent1"/>
+            </a:effectRef>
+            <a:fontRef idx="minor">
+              <a:schemeClr val="lt1"/>
+            </a:fontRef>
+          </p:style>
+          <p:txBody>
+            <a:bodyPr rtlCol="0" anchor="ctr"/>
+            <a:lstStyle/>
+            <a:p>
+              <a:pPr algn="ctr"/>
+              <a:endParaRPr lang="ko-KR" altLang="en-US">
+                <a:solidFill>
+                  <a:schemeClr val="tx1"/>
+                </a:solidFill>
+              </a:endParaRPr>
+            </a:p>
+          </p:txBody>
+        </p:sp>
+        <p:sp>
+          <p:nvSpPr>
+            <p:cNvPr id="53" name="TextBox 52">
+              <a:extLst>
+                <a:ext uri="{FF2B5EF4-FFF2-40B4-BE49-F238E27FC236}">
+                  <a16:creationId xmlns:a16="http://schemas.microsoft.com/office/drawing/2014/main" id="{67124010-C3DB-C0FC-D84A-8493B059CA03}"/>
+                </a:ext>
+              </a:extLst>
+            </p:cNvPr>
+            <p:cNvSpPr txBox="1"/>
+            <p:nvPr/>
+          </p:nvSpPr>
+          <p:spPr>
+            <a:xfrm>
+              <a:off x="1388894" y="2086091"/>
+              <a:ext cx="841725" cy="369332"/>
+            </a:xfrm>
+            <a:prstGeom prst="rect">
+              <a:avLst/>
+            </a:prstGeom>
+            <a:noFill/>
+          </p:spPr>
+          <p:txBody>
+            <a:bodyPr wrap="none" rtlCol="0">
+              <a:spAutoFit/>
+            </a:bodyPr>
+            <a:lstStyle/>
+            <a:p>
+              <a:r>
+                <a:rPr lang="en-US" altLang="ko-KR" dirty="0">
+                  <a:solidFill>
+                    <a:schemeClr val="tx1">
+                      <a:lumMod val="65000"/>
+                      <a:lumOff val="35000"/>
+                    </a:schemeClr>
+                  </a:solidFill>
+                </a:rPr>
+                <a:t>case15</a:t>
+              </a:r>
+              <a:endParaRPr lang="ko-KR" altLang="en-US" dirty="0">
+                <a:solidFill>
+                  <a:schemeClr val="tx1">
+                    <a:lumMod val="65000"/>
+                    <a:lumOff val="35000"/>
+                  </a:schemeClr>
+                </a:solidFill>
+              </a:endParaRPr>
+            </a:p>
+          </p:txBody>
+        </p:sp>
+        <p:sp>
+          <p:nvSpPr>
+            <p:cNvPr id="54" name="직사각형 53">
+              <a:extLst>
+                <a:ext uri="{FF2B5EF4-FFF2-40B4-BE49-F238E27FC236}">
+                  <a16:creationId xmlns:a16="http://schemas.microsoft.com/office/drawing/2014/main" id="{CB4EE820-5C5F-16D7-7D05-13F117A01D67}"/>
+                </a:ext>
+              </a:extLst>
+            </p:cNvPr>
+            <p:cNvSpPr/>
+            <p:nvPr/>
+          </p:nvSpPr>
+          <p:spPr>
+            <a:xfrm>
+              <a:off x="259081" y="457157"/>
+              <a:ext cx="1465455" cy="839530"/>
+            </a:xfrm>
+            <a:prstGeom prst="rect">
+              <a:avLst/>
+            </a:prstGeom>
+            <a:solidFill>
+              <a:schemeClr val="accent1">
+                <a:lumMod val="20000"/>
+                <a:lumOff val="80000"/>
+              </a:schemeClr>
+            </a:solidFill>
+          </p:spPr>
+          <p:style>
+            <a:lnRef idx="2">
+              <a:schemeClr val="dk1"/>
+            </a:lnRef>
+            <a:fillRef idx="1">
+              <a:schemeClr val="lt1"/>
+            </a:fillRef>
+            <a:effectRef idx="0">
+              <a:schemeClr val="dk1"/>
+            </a:effectRef>
+            <a:fontRef idx="minor">
+              <a:schemeClr val="dk1"/>
+            </a:fontRef>
+          </p:style>
+          <p:txBody>
+            <a:bodyPr rtlCol="0" anchor="ctr"/>
+            <a:lstStyle/>
+            <a:p>
+              <a:pPr algn="ctr"/>
+              <a:r>
+                <a:rPr lang="en-US" altLang="ko-KR" dirty="0" err="1"/>
+                <a:t>logobox</a:t>
+              </a:r>
+              <a:endParaRPr lang="ko-KR" altLang="en-US" dirty="0"/>
+            </a:p>
+          </p:txBody>
+        </p:sp>
+        <p:sp>
+          <p:nvSpPr>
+            <p:cNvPr id="55" name="직사각형 54">
+              <a:extLst>
+                <a:ext uri="{FF2B5EF4-FFF2-40B4-BE49-F238E27FC236}">
+                  <a16:creationId xmlns:a16="http://schemas.microsoft.com/office/drawing/2014/main" id="{2376C1FC-9152-CE4B-B7B4-B1C96DB04BCA}"/>
+                </a:ext>
+              </a:extLst>
+            </p:cNvPr>
+            <p:cNvSpPr/>
+            <p:nvPr/>
+          </p:nvSpPr>
+          <p:spPr>
+            <a:xfrm>
+              <a:off x="1859882" y="454025"/>
+              <a:ext cx="1353119" cy="856936"/>
+            </a:xfrm>
+            <a:prstGeom prst="rect">
+              <a:avLst/>
+            </a:prstGeom>
+            <a:solidFill>
+              <a:schemeClr val="accent2">
+                <a:lumMod val="20000"/>
+                <a:lumOff val="80000"/>
+              </a:schemeClr>
+            </a:solidFill>
+          </p:spPr>
+          <p:style>
+            <a:lnRef idx="2">
+              <a:schemeClr val="dk1"/>
+            </a:lnRef>
+            <a:fillRef idx="1">
+              <a:schemeClr val="lt1"/>
+            </a:fillRef>
+            <a:effectRef idx="0">
+              <a:schemeClr val="dk1"/>
+            </a:effectRef>
+            <a:fontRef idx="minor">
+              <a:schemeClr val="dk1"/>
+            </a:fontRef>
+          </p:style>
+          <p:txBody>
+            <a:bodyPr rtlCol="0" anchor="ctr"/>
+            <a:lstStyle/>
+            <a:p>
+              <a:pPr algn="ctr"/>
+              <a:r>
+                <a:rPr lang="en-US" altLang="ko-KR" dirty="0" err="1"/>
+                <a:t>namebox</a:t>
+              </a:r>
+              <a:endParaRPr lang="ko-KR" altLang="en-US" dirty="0"/>
+            </a:p>
+          </p:txBody>
+        </p:sp>
+        <p:sp>
+          <p:nvSpPr>
+            <p:cNvPr id="56" name="직사각형 55">
+              <a:extLst>
+                <a:ext uri="{FF2B5EF4-FFF2-40B4-BE49-F238E27FC236}">
+                  <a16:creationId xmlns:a16="http://schemas.microsoft.com/office/drawing/2014/main" id="{AFBD3E6A-2707-C283-5BCF-B23596F885D6}"/>
+                </a:ext>
+              </a:extLst>
+            </p:cNvPr>
+            <p:cNvSpPr/>
+            <p:nvPr/>
+          </p:nvSpPr>
+          <p:spPr>
+            <a:xfrm>
+              <a:off x="269583" y="1360080"/>
+              <a:ext cx="1815352" cy="420681"/>
+            </a:xfrm>
+            <a:prstGeom prst="rect">
+              <a:avLst/>
+            </a:prstGeom>
+            <a:solidFill>
+              <a:schemeClr val="accent4">
+                <a:lumMod val="20000"/>
+                <a:lumOff val="80000"/>
+              </a:schemeClr>
+            </a:solidFill>
+          </p:spPr>
+          <p:style>
+            <a:lnRef idx="2">
+              <a:schemeClr val="dk1"/>
+            </a:lnRef>
+            <a:fillRef idx="1">
+              <a:schemeClr val="lt1"/>
+            </a:fillRef>
+            <a:effectRef idx="0">
+              <a:schemeClr val="dk1"/>
+            </a:effectRef>
+            <a:fontRef idx="minor">
+              <a:schemeClr val="dk1"/>
+            </a:fontRef>
+          </p:style>
+          <p:txBody>
+            <a:bodyPr rtlCol="0" anchor="ctr"/>
+            <a:lstStyle/>
+            <a:p>
+              <a:pPr algn="ctr"/>
+              <a:r>
+                <a:rPr lang="en-US" altLang="ko-KR" dirty="0"/>
+                <a:t>optionbox1</a:t>
+              </a:r>
+              <a:endParaRPr lang="ko-KR" altLang="en-US" dirty="0"/>
+            </a:p>
+          </p:txBody>
+        </p:sp>
+        <p:sp>
+          <p:nvSpPr>
+            <p:cNvPr id="57" name="직사각형 56">
+              <a:extLst>
+                <a:ext uri="{FF2B5EF4-FFF2-40B4-BE49-F238E27FC236}">
+                  <a16:creationId xmlns:a16="http://schemas.microsoft.com/office/drawing/2014/main" id="{CE0A0E31-5AAE-EEF8-7AF1-142A751DC696}"/>
+                </a:ext>
+              </a:extLst>
+            </p:cNvPr>
+            <p:cNvSpPr/>
+            <p:nvPr/>
+          </p:nvSpPr>
+          <p:spPr>
+            <a:xfrm>
+              <a:off x="1620915" y="1582425"/>
+              <a:ext cx="1598984" cy="476580"/>
+            </a:xfrm>
+            <a:prstGeom prst="rect">
+              <a:avLst/>
+            </a:prstGeom>
+            <a:solidFill>
+              <a:schemeClr val="accent6">
+                <a:lumMod val="20000"/>
+                <a:lumOff val="80000"/>
+              </a:schemeClr>
+            </a:solidFill>
+          </p:spPr>
+          <p:style>
+            <a:lnRef idx="2">
+              <a:schemeClr val="dk1"/>
+            </a:lnRef>
+            <a:fillRef idx="1">
+              <a:schemeClr val="lt1"/>
+            </a:fillRef>
+            <a:effectRef idx="0">
+              <a:schemeClr val="dk1"/>
+            </a:effectRef>
+            <a:fontRef idx="minor">
+              <a:schemeClr val="dk1"/>
+            </a:fontRef>
+          </p:style>
+          <p:txBody>
+            <a:bodyPr rtlCol="0" anchor="ctr"/>
+            <a:lstStyle/>
+            <a:p>
+              <a:pPr algn="ctr"/>
+              <a:r>
+                <a:rPr lang="en-US" altLang="ko-KR" dirty="0"/>
+                <a:t>optionbox2</a:t>
+              </a:r>
+              <a:endParaRPr lang="ko-KR" altLang="en-US" dirty="0"/>
+            </a:p>
+          </p:txBody>
+        </p:sp>
+      </p:grpSp>
+      <p:grpSp>
+        <p:nvGrpSpPr>
+          <p:cNvPr id="58" name="그룹 57">
+            <a:extLst>
+              <a:ext uri="{FF2B5EF4-FFF2-40B4-BE49-F238E27FC236}">
+                <a16:creationId xmlns:a16="http://schemas.microsoft.com/office/drawing/2014/main" id="{D1AC4A3E-863F-8425-DED7-F1F463315BE1}"/>
+              </a:ext>
+            </a:extLst>
+          </p:cNvPr>
+          <p:cNvGrpSpPr/>
+          <p:nvPr/>
+        </p:nvGrpSpPr>
+        <p:grpSpPr>
+          <a:xfrm>
+            <a:off x="3504586" y="7398922"/>
+            <a:ext cx="3240000" cy="2098212"/>
+            <a:chOff x="125563" y="357211"/>
+            <a:chExt cx="3240000" cy="2098212"/>
+          </a:xfrm>
+        </p:grpSpPr>
+        <p:sp>
+          <p:nvSpPr>
+            <p:cNvPr id="59" name="직사각형 58">
+              <a:extLst>
+                <a:ext uri="{FF2B5EF4-FFF2-40B4-BE49-F238E27FC236}">
+                  <a16:creationId xmlns:a16="http://schemas.microsoft.com/office/drawing/2014/main" id="{65C96C72-5AE8-658F-6C18-8A03FCF858E0}"/>
+                </a:ext>
+              </a:extLst>
+            </p:cNvPr>
+            <p:cNvSpPr/>
+            <p:nvPr/>
+          </p:nvSpPr>
+          <p:spPr>
+            <a:xfrm>
+              <a:off x="125563" y="357211"/>
+              <a:ext cx="3240000" cy="1800000"/>
+            </a:xfrm>
+            <a:prstGeom prst="rect">
+              <a:avLst/>
+            </a:prstGeom>
+            <a:noFill/>
+            <a:ln>
+              <a:solidFill>
+                <a:schemeClr val="tx1"/>
+              </a:solidFill>
+            </a:ln>
+          </p:spPr>
+          <p:style>
+            <a:lnRef idx="2">
+              <a:schemeClr val="accent1">
+                <a:shade val="50000"/>
+              </a:schemeClr>
+            </a:lnRef>
+            <a:fillRef idx="1">
+              <a:schemeClr val="accent1"/>
+            </a:fillRef>
+            <a:effectRef idx="0">
+              <a:schemeClr val="accent1"/>
+            </a:effectRef>
+            <a:fontRef idx="minor">
+              <a:schemeClr val="lt1"/>
+            </a:fontRef>
+          </p:style>
+          <p:txBody>
+            <a:bodyPr rtlCol="0" anchor="ctr"/>
+            <a:lstStyle/>
+            <a:p>
+              <a:pPr algn="ctr"/>
+              <a:endParaRPr lang="ko-KR" altLang="en-US">
+                <a:solidFill>
+                  <a:schemeClr val="tx1"/>
+                </a:solidFill>
+              </a:endParaRPr>
+            </a:p>
+          </p:txBody>
+        </p:sp>
+        <p:sp>
+          <p:nvSpPr>
+            <p:cNvPr id="60" name="TextBox 59">
+              <a:extLst>
+                <a:ext uri="{FF2B5EF4-FFF2-40B4-BE49-F238E27FC236}">
+                  <a16:creationId xmlns:a16="http://schemas.microsoft.com/office/drawing/2014/main" id="{B430BC7E-C7CF-F710-525C-0BC5D37A0648}"/>
+                </a:ext>
+              </a:extLst>
+            </p:cNvPr>
+            <p:cNvSpPr txBox="1"/>
+            <p:nvPr/>
+          </p:nvSpPr>
+          <p:spPr>
+            <a:xfrm>
+              <a:off x="1388894" y="2086091"/>
+              <a:ext cx="830356" cy="369332"/>
+            </a:xfrm>
+            <a:prstGeom prst="rect">
+              <a:avLst/>
+            </a:prstGeom>
+            <a:noFill/>
+          </p:spPr>
+          <p:txBody>
+            <a:bodyPr wrap="none" rtlCol="0">
+              <a:spAutoFit/>
+            </a:bodyPr>
+            <a:lstStyle/>
+            <a:p>
+              <a:r>
+                <a:rPr lang="en-US" altLang="ko-KR" dirty="0">
+                  <a:solidFill>
+                    <a:schemeClr val="tx1">
+                      <a:lumMod val="65000"/>
+                      <a:lumOff val="35000"/>
+                    </a:schemeClr>
+                  </a:solidFill>
+                </a:rPr>
+                <a:t>case16</a:t>
+              </a:r>
+              <a:endParaRPr lang="ko-KR" altLang="en-US" dirty="0">
+                <a:solidFill>
+                  <a:schemeClr val="tx1">
+                    <a:lumMod val="65000"/>
+                    <a:lumOff val="35000"/>
+                  </a:schemeClr>
+                </a:solidFill>
+              </a:endParaRPr>
+            </a:p>
+          </p:txBody>
+        </p:sp>
+        <p:sp>
+          <p:nvSpPr>
+            <p:cNvPr id="62" name="직사각형 61">
+              <a:extLst>
+                <a:ext uri="{FF2B5EF4-FFF2-40B4-BE49-F238E27FC236}">
+                  <a16:creationId xmlns:a16="http://schemas.microsoft.com/office/drawing/2014/main" id="{3C4A44D1-9F27-655F-3737-1291A3B782AD}"/>
+                </a:ext>
+              </a:extLst>
+            </p:cNvPr>
+            <p:cNvSpPr/>
+            <p:nvPr/>
+          </p:nvSpPr>
+          <p:spPr>
+            <a:xfrm>
+              <a:off x="1727592" y="457156"/>
+              <a:ext cx="1493127" cy="804717"/>
+            </a:xfrm>
+            <a:prstGeom prst="rect">
+              <a:avLst/>
+            </a:prstGeom>
+            <a:solidFill>
+              <a:schemeClr val="accent1">
+                <a:lumMod val="20000"/>
+                <a:lumOff val="80000"/>
+              </a:schemeClr>
+            </a:solidFill>
+          </p:spPr>
+          <p:style>
+            <a:lnRef idx="2">
+              <a:schemeClr val="dk1"/>
+            </a:lnRef>
+            <a:fillRef idx="1">
+              <a:schemeClr val="lt1"/>
+            </a:fillRef>
+            <a:effectRef idx="0">
+              <a:schemeClr val="dk1"/>
+            </a:effectRef>
+            <a:fontRef idx="minor">
+              <a:schemeClr val="dk1"/>
+            </a:fontRef>
+          </p:style>
+          <p:txBody>
+            <a:bodyPr rtlCol="0" anchor="ctr"/>
+            <a:lstStyle/>
+            <a:p>
+              <a:pPr algn="ctr"/>
+              <a:r>
+                <a:rPr lang="en-US" altLang="ko-KR" dirty="0" err="1"/>
+                <a:t>logobox</a:t>
+              </a:r>
+              <a:endParaRPr lang="ko-KR" altLang="en-US" dirty="0"/>
+            </a:p>
+          </p:txBody>
+        </p:sp>
+        <p:sp>
+          <p:nvSpPr>
+            <p:cNvPr id="63" name="직사각형 62">
+              <a:extLst>
+                <a:ext uri="{FF2B5EF4-FFF2-40B4-BE49-F238E27FC236}">
+                  <a16:creationId xmlns:a16="http://schemas.microsoft.com/office/drawing/2014/main" id="{9491D668-5FCF-52E5-BB84-08D7EE200640}"/>
+                </a:ext>
+              </a:extLst>
+            </p:cNvPr>
+            <p:cNvSpPr/>
+            <p:nvPr/>
+          </p:nvSpPr>
+          <p:spPr>
+            <a:xfrm>
+              <a:off x="259080" y="491970"/>
+              <a:ext cx="1341639" cy="804717"/>
+            </a:xfrm>
+            <a:prstGeom prst="rect">
+              <a:avLst/>
+            </a:prstGeom>
+            <a:solidFill>
+              <a:schemeClr val="accent2">
+                <a:lumMod val="20000"/>
+                <a:lumOff val="80000"/>
+              </a:schemeClr>
+            </a:solidFill>
+          </p:spPr>
+          <p:style>
+            <a:lnRef idx="2">
+              <a:schemeClr val="dk1"/>
+            </a:lnRef>
+            <a:fillRef idx="1">
+              <a:schemeClr val="lt1"/>
+            </a:fillRef>
+            <a:effectRef idx="0">
+              <a:schemeClr val="dk1"/>
+            </a:effectRef>
+            <a:fontRef idx="minor">
+              <a:schemeClr val="dk1"/>
+            </a:fontRef>
+          </p:style>
+          <p:txBody>
+            <a:bodyPr rtlCol="0" anchor="ctr"/>
+            <a:lstStyle/>
+            <a:p>
+              <a:pPr algn="ctr"/>
+              <a:r>
+                <a:rPr lang="en-US" altLang="ko-KR" dirty="0" err="1"/>
+                <a:t>namebox</a:t>
+              </a:r>
+              <a:endParaRPr lang="ko-KR" altLang="en-US" dirty="0"/>
+            </a:p>
+          </p:txBody>
+        </p:sp>
+        <p:sp>
+          <p:nvSpPr>
+            <p:cNvPr id="64" name="직사각형 63">
+              <a:extLst>
+                <a:ext uri="{FF2B5EF4-FFF2-40B4-BE49-F238E27FC236}">
+                  <a16:creationId xmlns:a16="http://schemas.microsoft.com/office/drawing/2014/main" id="{A719A408-98E9-9B63-F3B9-5B5046A6AA75}"/>
+                </a:ext>
+              </a:extLst>
+            </p:cNvPr>
+            <p:cNvSpPr/>
+            <p:nvPr/>
+          </p:nvSpPr>
+          <p:spPr>
+            <a:xfrm>
+              <a:off x="269583" y="1360080"/>
+              <a:ext cx="1689876" cy="506283"/>
+            </a:xfrm>
+            <a:prstGeom prst="rect">
+              <a:avLst/>
+            </a:prstGeom>
+            <a:solidFill>
+              <a:schemeClr val="accent4">
+                <a:lumMod val="20000"/>
+                <a:lumOff val="80000"/>
+              </a:schemeClr>
+            </a:solidFill>
+          </p:spPr>
+          <p:style>
+            <a:lnRef idx="2">
+              <a:schemeClr val="dk1"/>
+            </a:lnRef>
+            <a:fillRef idx="1">
+              <a:schemeClr val="lt1"/>
+            </a:fillRef>
+            <a:effectRef idx="0">
+              <a:schemeClr val="dk1"/>
+            </a:effectRef>
+            <a:fontRef idx="minor">
+              <a:schemeClr val="dk1"/>
+            </a:fontRef>
+          </p:style>
+          <p:txBody>
+            <a:bodyPr rtlCol="0" anchor="ctr"/>
+            <a:lstStyle/>
+            <a:p>
+              <a:pPr algn="ctr"/>
+              <a:r>
+                <a:rPr lang="en-US" altLang="ko-KR" dirty="0"/>
+                <a:t>optionbox1</a:t>
+              </a:r>
+              <a:endParaRPr lang="ko-KR" altLang="en-US" dirty="0"/>
+            </a:p>
+          </p:txBody>
+        </p:sp>
+        <p:sp>
+          <p:nvSpPr>
+            <p:cNvPr id="65" name="직사각형 64">
+              <a:extLst>
+                <a:ext uri="{FF2B5EF4-FFF2-40B4-BE49-F238E27FC236}">
+                  <a16:creationId xmlns:a16="http://schemas.microsoft.com/office/drawing/2014/main" id="{6023A731-C9B1-E724-82C8-619F1D7A8160}"/>
+                </a:ext>
+              </a:extLst>
+            </p:cNvPr>
+            <p:cNvSpPr/>
+            <p:nvPr/>
+          </p:nvSpPr>
+          <p:spPr>
+            <a:xfrm>
+              <a:off x="1461693" y="1689673"/>
+              <a:ext cx="1758205" cy="369332"/>
+            </a:xfrm>
+            <a:prstGeom prst="rect">
+              <a:avLst/>
+            </a:prstGeom>
+            <a:solidFill>
+              <a:schemeClr val="accent6">
+                <a:lumMod val="20000"/>
+                <a:lumOff val="80000"/>
+              </a:schemeClr>
+            </a:solidFill>
+          </p:spPr>
+          <p:style>
+            <a:lnRef idx="2">
+              <a:schemeClr val="dk1"/>
+            </a:lnRef>
+            <a:fillRef idx="1">
+              <a:schemeClr val="lt1"/>
+            </a:fillRef>
+            <a:effectRef idx="0">
+              <a:schemeClr val="dk1"/>
+            </a:effectRef>
+            <a:fontRef idx="minor">
+              <a:schemeClr val="dk1"/>
+            </a:fontRef>
+          </p:style>
+          <p:txBody>
+            <a:bodyPr rtlCol="0" anchor="ctr"/>
+            <a:lstStyle/>
+            <a:p>
+              <a:pPr algn="ctr"/>
+              <a:r>
+                <a:rPr lang="en-US" altLang="ko-KR" dirty="0"/>
+                <a:t>optionbox2</a:t>
+              </a:r>
+              <a:endParaRPr lang="ko-KR" altLang="en-US" dirty="0"/>
+            </a:p>
+          </p:txBody>
+        </p:sp>
+      </p:grpSp>
     </p:spTree>
     <p:extLst>
       <p:ext uri="{BB962C8B-B14F-4D97-AF65-F5344CB8AC3E}">

</xml_diff>